<commit_message>
updating for core 2
</commit_message>
<xml_diff>
--- a/aspnet5/slides/02_Middleware.pptx
+++ b/aspnet5/slides/02_Middleware.pptx
@@ -5,28 +5,26 @@
     <p:sldMasterId id="2147483772" r:id="rId1"/>
   </p:sldMasterIdLst>
   <p:notesMasterIdLst>
-    <p:notesMasterId r:id="rId18"/>
+    <p:notesMasterId r:id="rId16"/>
   </p:notesMasterIdLst>
   <p:handoutMasterIdLst>
-    <p:handoutMasterId r:id="rId19"/>
+    <p:handoutMasterId r:id="rId17"/>
   </p:handoutMasterIdLst>
   <p:sldIdLst>
     <p:sldId id="327" r:id="rId2"/>
-    <p:sldId id="330" r:id="rId3"/>
-    <p:sldId id="328" r:id="rId4"/>
-    <p:sldId id="343" r:id="rId5"/>
-    <p:sldId id="335" r:id="rId6"/>
-    <p:sldId id="334" r:id="rId7"/>
-    <p:sldId id="336" r:id="rId8"/>
-    <p:sldId id="337" r:id="rId9"/>
-    <p:sldId id="338" r:id="rId10"/>
-    <p:sldId id="339" r:id="rId11"/>
-    <p:sldId id="341" r:id="rId12"/>
-    <p:sldId id="340" r:id="rId13"/>
-    <p:sldId id="342" r:id="rId14"/>
-    <p:sldId id="344" r:id="rId15"/>
-    <p:sldId id="346" r:id="rId16"/>
-    <p:sldId id="345" r:id="rId17"/>
+    <p:sldId id="343" r:id="rId3"/>
+    <p:sldId id="335" r:id="rId4"/>
+    <p:sldId id="334" r:id="rId5"/>
+    <p:sldId id="336" r:id="rId6"/>
+    <p:sldId id="337" r:id="rId7"/>
+    <p:sldId id="338" r:id="rId8"/>
+    <p:sldId id="339" r:id="rId9"/>
+    <p:sldId id="341" r:id="rId10"/>
+    <p:sldId id="340" r:id="rId11"/>
+    <p:sldId id="342" r:id="rId12"/>
+    <p:sldId id="344" r:id="rId13"/>
+    <p:sldId id="346" r:id="rId14"/>
+    <p:sldId id="345" r:id="rId15"/>
   </p:sldIdLst>
   <p:sldSz cx="9144000" cy="6858000" type="screen4x3"/>
   <p:notesSz cx="7302500" cy="9588500"/>
@@ -161,8 +159,6 @@
         <p14:section name="Default Section" id="{1FAFB904-873B-4B5C-A5B3-7BBCB9659514}">
           <p14:sldIdLst>
             <p14:sldId id="327"/>
-            <p14:sldId id="330"/>
-            <p14:sldId id="328"/>
             <p14:sldId id="343"/>
             <p14:sldId id="335"/>
             <p14:sldId id="334"/>
@@ -303,7 +299,7 @@
               <a:pPr>
                 <a:defRPr/>
               </a:pPr>
-              <a:t>4/30/2016</a:t>
+              <a:t>3/8/2018</a:t>
             </a:fld>
             <a:endParaRPr lang="en-US"/>
           </a:p>
@@ -1015,7 +1011,7 @@
               <a:pPr>
                 <a:defRPr/>
               </a:pPr>
-              <a:t>15</a:t>
+              <a:t>13</a:t>
             </a:fld>
             <a:endParaRPr lang="en-US"/>
           </a:p>
@@ -2926,239 +2922,6 @@
           <a:lstStyle/>
           <a:p>
             <a:r>
-              <a:rPr lang="en-US" dirty="0" err="1"/>
-              <a:t>app.UseMiddleware</a:t>
-            </a:r>
-            <a:endParaRPr lang="en-US" dirty="0"/>
-          </a:p>
-        </p:txBody>
-      </p:sp>
-      <p:sp>
-        <p:nvSpPr>
-          <p:cNvPr id="3" name="Text Placeholder 2"/>
-          <p:cNvSpPr>
-            <a:spLocks noGrp="1"/>
-          </p:cNvSpPr>
-          <p:nvPr>
-            <p:ph type="body" idx="1"/>
-          </p:nvPr>
-        </p:nvSpPr>
-        <p:spPr/>
-        <p:txBody>
-          <a:bodyPr/>
-          <a:lstStyle/>
-          <a:p>
-            <a:r>
-              <a:rPr lang="en-US" dirty="0"/>
-              <a:t>Encapsulate middleware in a class</a:t>
-            </a:r>
-          </a:p>
-          <a:p>
-            <a:r>
-              <a:rPr lang="en-US" dirty="0"/>
-              <a:t>Requires constructor and Invoke method</a:t>
-            </a:r>
-          </a:p>
-        </p:txBody>
-      </p:sp>
-      <p:pic>
-        <p:nvPicPr>
-          <p:cNvPr id="4" name="Picture 3"/>
-          <p:cNvPicPr>
-            <a:picLocks noChangeAspect="1"/>
-          </p:cNvPicPr>
-          <p:nvPr/>
-        </p:nvPicPr>
-        <p:blipFill>
-          <a:blip r:embed="rId2"/>
-          <a:stretch>
-            <a:fillRect/>
-          </a:stretch>
-        </p:blipFill>
-        <p:spPr>
-          <a:xfrm>
-            <a:off x="685800" y="2671762"/>
-            <a:ext cx="5457825" cy="2047875"/>
-          </a:xfrm>
-          <a:prstGeom prst="rect">
-            <a:avLst/>
-          </a:prstGeom>
-        </p:spPr>
-      </p:pic>
-      <p:pic>
-        <p:nvPicPr>
-          <p:cNvPr id="5" name="Picture 4"/>
-          <p:cNvPicPr>
-            <a:picLocks noChangeAspect="1"/>
-          </p:cNvPicPr>
-          <p:nvPr/>
-        </p:nvPicPr>
-        <p:blipFill>
-          <a:blip r:embed="rId3"/>
-          <a:stretch>
-            <a:fillRect/>
-          </a:stretch>
-        </p:blipFill>
-        <p:spPr>
-          <a:xfrm>
-            <a:off x="3276600" y="5002319"/>
-            <a:ext cx="5219700" cy="638175"/>
-          </a:xfrm>
-          <a:prstGeom prst="rect">
-            <a:avLst/>
-          </a:prstGeom>
-        </p:spPr>
-      </p:pic>
-    </p:spTree>
-    <p:extLst>
-      <p:ext uri="{BB962C8B-B14F-4D97-AF65-F5344CB8AC3E}">
-        <p14:creationId xmlns:p14="http://schemas.microsoft.com/office/powerpoint/2010/main" val="1171627209"/>
-      </p:ext>
-    </p:extLst>
-  </p:cSld>
-  <p:clrMapOvr>
-    <a:masterClrMapping/>
-  </p:clrMapOvr>
-  <p:transition>
-    <p:fade/>
-  </p:transition>
-</p:sld>
-</file>
-
-<file path=ppt/slides/slide11.xml><?xml version="1.0" encoding="utf-8"?>
-<p:sld xmlns:a="http://schemas.openxmlformats.org/drawingml/2006/main" xmlns:r="http://schemas.openxmlformats.org/officeDocument/2006/relationships" xmlns:p="http://schemas.openxmlformats.org/presentationml/2006/main">
-  <p:cSld>
-    <p:spTree>
-      <p:nvGrpSpPr>
-        <p:cNvPr id="1" name=""/>
-        <p:cNvGrpSpPr/>
-        <p:nvPr/>
-      </p:nvGrpSpPr>
-      <p:grpSpPr>
-        <a:xfrm>
-          <a:off x="0" y="0"/>
-          <a:ext cx="0" cy="0"/>
-          <a:chOff x="0" y="0"/>
-          <a:chExt cx="0" cy="0"/>
-        </a:xfrm>
-      </p:grpSpPr>
-      <p:sp>
-        <p:nvSpPr>
-          <p:cNvPr id="2" name="Title 1"/>
-          <p:cNvSpPr>
-            <a:spLocks noGrp="1"/>
-          </p:cNvSpPr>
-          <p:nvPr>
-            <p:ph type="title"/>
-          </p:nvPr>
-        </p:nvSpPr>
-        <p:spPr/>
-        <p:txBody>
-          <a:bodyPr/>
-          <a:lstStyle/>
-          <a:p>
-            <a:r>
-              <a:rPr lang="en-US" dirty="0"/>
-              <a:t>Custom Middleware</a:t>
-            </a:r>
-          </a:p>
-        </p:txBody>
-      </p:sp>
-      <p:sp>
-        <p:nvSpPr>
-          <p:cNvPr id="3" name="Text Placeholder 2"/>
-          <p:cNvSpPr>
-            <a:spLocks noGrp="1"/>
-          </p:cNvSpPr>
-          <p:nvPr>
-            <p:ph type="body" idx="1"/>
-          </p:nvPr>
-        </p:nvSpPr>
-        <p:spPr/>
-        <p:txBody>
-          <a:bodyPr/>
-          <a:lstStyle/>
-          <a:p>
-            <a:r>
-              <a:rPr lang="en-US" dirty="0"/>
-              <a:t>Convention is to create custom options and Use methods. </a:t>
-            </a:r>
-          </a:p>
-        </p:txBody>
-      </p:sp>
-      <p:pic>
-        <p:nvPicPr>
-          <p:cNvPr id="4" name="Picture 3"/>
-          <p:cNvPicPr>
-            <a:picLocks noChangeAspect="1"/>
-          </p:cNvPicPr>
-          <p:nvPr/>
-        </p:nvPicPr>
-        <p:blipFill>
-          <a:blip r:embed="rId2"/>
-          <a:stretch>
-            <a:fillRect/>
-          </a:stretch>
-        </p:blipFill>
-        <p:spPr>
-          <a:xfrm>
-            <a:off x="1885950" y="2943225"/>
-            <a:ext cx="5372100" cy="971550"/>
-          </a:xfrm>
-          <a:prstGeom prst="rect">
-            <a:avLst/>
-          </a:prstGeom>
-        </p:spPr>
-      </p:pic>
-    </p:spTree>
-    <p:extLst>
-      <p:ext uri="{BB962C8B-B14F-4D97-AF65-F5344CB8AC3E}">
-        <p14:creationId xmlns:p14="http://schemas.microsoft.com/office/powerpoint/2010/main" val="3694306967"/>
-      </p:ext>
-    </p:extLst>
-  </p:cSld>
-  <p:clrMapOvr>
-    <a:masterClrMapping/>
-  </p:clrMapOvr>
-  <p:transition>
-    <p:fade/>
-  </p:transition>
-</p:sld>
-</file>
-
-<file path=ppt/slides/slide12.xml><?xml version="1.0" encoding="utf-8"?>
-<p:sld xmlns:a="http://schemas.openxmlformats.org/drawingml/2006/main" xmlns:r="http://schemas.openxmlformats.org/officeDocument/2006/relationships" xmlns:p="http://schemas.openxmlformats.org/presentationml/2006/main">
-  <p:cSld>
-    <p:spTree>
-      <p:nvGrpSpPr>
-        <p:cNvPr id="1" name=""/>
-        <p:cNvGrpSpPr/>
-        <p:nvPr/>
-      </p:nvGrpSpPr>
-      <p:grpSpPr>
-        <a:xfrm>
-          <a:off x="0" y="0"/>
-          <a:ext cx="0" cy="0"/>
-          <a:chOff x="0" y="0"/>
-          <a:chExt cx="0" cy="0"/>
-        </a:xfrm>
-      </p:grpSpPr>
-      <p:sp>
-        <p:nvSpPr>
-          <p:cNvPr id="2" name="Title 1"/>
-          <p:cNvSpPr>
-            <a:spLocks noGrp="1"/>
-          </p:cNvSpPr>
-          <p:nvPr>
-            <p:ph type="title"/>
-          </p:nvPr>
-        </p:nvSpPr>
-        <p:spPr/>
-        <p:txBody>
-          <a:bodyPr/>
-          <a:lstStyle/>
-          <a:p>
-            <a:r>
               <a:rPr lang="en-US" dirty="0"/>
               <a:t>Middleware Pipelines</a:t>
             </a:r>
@@ -3250,7 +3013,7 @@
 </p:sld>
 </file>
 
-<file path=ppt/slides/slide13.xml><?xml version="1.0" encoding="utf-8"?>
+<file path=ppt/slides/slide11.xml><?xml version="1.0" encoding="utf-8"?>
 <p:sld xmlns:a="http://schemas.openxmlformats.org/drawingml/2006/main" xmlns:r="http://schemas.openxmlformats.org/officeDocument/2006/relationships" xmlns:p="http://schemas.openxmlformats.org/presentationml/2006/main">
   <p:cSld>
     <p:spTree>
@@ -3371,7 +3134,7 @@
 </p:sld>
 </file>
 
-<file path=ppt/slides/slide14.xml><?xml version="1.0" encoding="utf-8"?>
+<file path=ppt/slides/slide12.xml><?xml version="1.0" encoding="utf-8"?>
 <p:sld xmlns:a="http://schemas.openxmlformats.org/drawingml/2006/main" xmlns:r="http://schemas.openxmlformats.org/officeDocument/2006/relationships" xmlns:p="http://schemas.openxmlformats.org/presentationml/2006/main">
   <p:cSld>
     <p:spTree>
@@ -3502,7 +3265,7 @@
 </p:sld>
 </file>
 
-<file path=ppt/slides/slide15.xml><?xml version="1.0" encoding="utf-8"?>
+<file path=ppt/slides/slide13.xml><?xml version="1.0" encoding="utf-8"?>
 <p:sld xmlns:a="http://schemas.openxmlformats.org/drawingml/2006/main" xmlns:r="http://schemas.openxmlformats.org/officeDocument/2006/relationships" xmlns:p="http://schemas.openxmlformats.org/presentationml/2006/main">
   <p:cSld>
     <p:spTree>
@@ -3609,7 +3372,7 @@
 </p:sld>
 </file>
 
-<file path=ppt/slides/slide16.xml><?xml version="1.0" encoding="utf-8"?>
+<file path=ppt/slides/slide14.xml><?xml version="1.0" encoding="utf-8"?>
 <p:sld xmlns:a="http://schemas.openxmlformats.org/drawingml/2006/main" xmlns:r="http://schemas.openxmlformats.org/officeDocument/2006/relationships" xmlns:p="http://schemas.openxmlformats.org/presentationml/2006/main">
   <p:cSld>
     <p:spTree>
@@ -4087,314 +3850,6 @@
           <a:p>
             <a:r>
               <a:rPr lang="en-US" dirty="0"/>
-              <a:t>Architecture</a:t>
-            </a:r>
-          </a:p>
-        </p:txBody>
-      </p:sp>
-      <p:sp>
-        <p:nvSpPr>
-          <p:cNvPr id="4" name="Rectangle 3"/>
-          <p:cNvSpPr/>
-          <p:nvPr/>
-        </p:nvSpPr>
-        <p:spPr bwMode="auto">
-          <a:xfrm>
-            <a:off x="838200" y="2344057"/>
-            <a:ext cx="2177143" cy="2380343"/>
-          </a:xfrm>
-          <a:prstGeom prst="rect">
-            <a:avLst/>
-          </a:prstGeom>
-          <a:solidFill>
-            <a:srgbClr val="D3D3A9"/>
-          </a:solidFill>
-          <a:ln w="9525" algn="ctr">
-            <a:solidFill>
-              <a:schemeClr val="tx1"/>
-            </a:solidFill>
-            <a:miter lim="800000"/>
-            <a:headEnd/>
-            <a:tailEnd/>
-          </a:ln>
-          <a:effectLst>
-            <a:outerShdw blurRad="50800" dist="38100" dir="2700000" algn="tl" rotWithShape="0">
-              <a:prstClr val="black">
-                <a:alpha val="40000"/>
-              </a:prstClr>
-            </a:outerShdw>
-          </a:effectLst>
-        </p:spPr>
-        <p:txBody>
-          <a:bodyPr wrap="none" rtlCol="0" anchor="ctr"/>
-          <a:lstStyle/>
-          <a:p>
-            <a:pPr algn="ctr"/>
-            <a:r>
-              <a:rPr lang="en-US" sz="2000" dirty="0">
-                <a:latin typeface="Tekton Pro" pitchFamily="34" charset="0"/>
-              </a:rPr>
-              <a:t>Web Framework</a:t>
-            </a:r>
-          </a:p>
-        </p:txBody>
-      </p:sp>
-      <p:sp>
-        <p:nvSpPr>
-          <p:cNvPr id="5" name="Rectangle 4"/>
-          <p:cNvSpPr/>
-          <p:nvPr/>
-        </p:nvSpPr>
-        <p:spPr bwMode="auto">
-          <a:xfrm>
-            <a:off x="6201229" y="2344057"/>
-            <a:ext cx="2177143" cy="2380343"/>
-          </a:xfrm>
-          <a:prstGeom prst="rect">
-            <a:avLst/>
-          </a:prstGeom>
-          <a:solidFill>
-            <a:srgbClr val="D3D3A9"/>
-          </a:solidFill>
-          <a:ln w="9525" algn="ctr">
-            <a:solidFill>
-              <a:schemeClr val="tx1"/>
-            </a:solidFill>
-            <a:miter lim="800000"/>
-            <a:headEnd/>
-            <a:tailEnd/>
-          </a:ln>
-          <a:effectLst>
-            <a:outerShdw blurRad="50800" dist="38100" dir="2700000" algn="tl" rotWithShape="0">
-              <a:prstClr val="black">
-                <a:alpha val="40000"/>
-              </a:prstClr>
-            </a:outerShdw>
-          </a:effectLst>
-        </p:spPr>
-        <p:txBody>
-          <a:bodyPr wrap="none" rtlCol="0" anchor="ctr"/>
-          <a:lstStyle/>
-          <a:p>
-            <a:pPr algn="ctr"/>
-            <a:r>
-              <a:rPr lang="en-US" sz="2000" dirty="0">
-                <a:latin typeface="Tekton Pro" pitchFamily="34" charset="0"/>
-              </a:rPr>
-              <a:t>Web Server</a:t>
-            </a:r>
-          </a:p>
-        </p:txBody>
-      </p:sp>
-      <p:sp>
-        <p:nvSpPr>
-          <p:cNvPr id="6" name="Left-Right Arrow 5"/>
-          <p:cNvSpPr/>
-          <p:nvPr/>
-        </p:nvSpPr>
-        <p:spPr bwMode="auto">
-          <a:xfrm>
-            <a:off x="3559629" y="3135086"/>
-            <a:ext cx="2104571" cy="725714"/>
-          </a:xfrm>
-          <a:prstGeom prst="leftRightArrow">
-            <a:avLst/>
-          </a:prstGeom>
-          <a:solidFill>
-            <a:srgbClr val="D3D3A9"/>
-          </a:solidFill>
-          <a:ln w="9525" algn="ctr">
-            <a:solidFill>
-              <a:schemeClr val="tx1"/>
-            </a:solidFill>
-            <a:miter lim="800000"/>
-            <a:headEnd/>
-            <a:tailEnd/>
-          </a:ln>
-          <a:effectLst>
-            <a:outerShdw blurRad="50800" dist="38100" dir="2700000" algn="tl" rotWithShape="0">
-              <a:prstClr val="black">
-                <a:alpha val="40000"/>
-              </a:prstClr>
-            </a:outerShdw>
-          </a:effectLst>
-        </p:spPr>
-        <p:txBody>
-          <a:bodyPr wrap="none" rtlCol="0" anchor="ctr"/>
-          <a:lstStyle/>
-          <a:p>
-            <a:pPr algn="ctr"/>
-            <a:endParaRPr lang="en-US" sz="2000" dirty="0">
-              <a:latin typeface="Tekton Pro" pitchFamily="34" charset="0"/>
-            </a:endParaRPr>
-          </a:p>
-        </p:txBody>
-      </p:sp>
-    </p:spTree>
-    <p:extLst>
-      <p:ext uri="{BB962C8B-B14F-4D97-AF65-F5344CB8AC3E}">
-        <p14:creationId xmlns:p14="http://schemas.microsoft.com/office/powerpoint/2010/main" val="250021224"/>
-      </p:ext>
-    </p:extLst>
-  </p:cSld>
-  <p:clrMapOvr>
-    <a:masterClrMapping/>
-  </p:clrMapOvr>
-  <p:transition>
-    <p:fade/>
-  </p:transition>
-</p:sld>
-</file>
-
-<file path=ppt/slides/slide3.xml><?xml version="1.0" encoding="utf-8"?>
-<p:sld xmlns:a="http://schemas.openxmlformats.org/drawingml/2006/main" xmlns:r="http://schemas.openxmlformats.org/officeDocument/2006/relationships" xmlns:p="http://schemas.openxmlformats.org/presentationml/2006/main">
-  <p:cSld>
-    <p:spTree>
-      <p:nvGrpSpPr>
-        <p:cNvPr id="1" name=""/>
-        <p:cNvGrpSpPr/>
-        <p:nvPr/>
-      </p:nvGrpSpPr>
-      <p:grpSpPr>
-        <a:xfrm>
-          <a:off x="0" y="0"/>
-          <a:ext cx="0" cy="0"/>
-          <a:chOff x="0" y="0"/>
-          <a:chExt cx="0" cy="0"/>
-        </a:xfrm>
-      </p:grpSpPr>
-      <p:sp>
-        <p:nvSpPr>
-          <p:cNvPr id="2" name="Title 1"/>
-          <p:cNvSpPr>
-            <a:spLocks noGrp="1"/>
-          </p:cNvSpPr>
-          <p:nvPr>
-            <p:ph type="title"/>
-          </p:nvPr>
-        </p:nvSpPr>
-        <p:spPr/>
-        <p:txBody>
-          <a:bodyPr/>
-          <a:lstStyle/>
-          <a:p>
-            <a:r>
-              <a:rPr lang="en-US" dirty="0"/>
-              <a:t>Processing HTTP Messages</a:t>
-            </a:r>
-          </a:p>
-        </p:txBody>
-      </p:sp>
-      <p:sp>
-        <p:nvSpPr>
-          <p:cNvPr id="3" name="Text Placeholder 2"/>
-          <p:cNvSpPr>
-            <a:spLocks noGrp="1"/>
-          </p:cNvSpPr>
-          <p:nvPr>
-            <p:ph type="body" idx="1"/>
-          </p:nvPr>
-        </p:nvSpPr>
-        <p:spPr/>
-        <p:txBody>
-          <a:bodyPr/>
-          <a:lstStyle/>
-          <a:p>
-            <a:endParaRPr lang="en-US"/>
-          </a:p>
-        </p:txBody>
-      </p:sp>
-      <p:pic>
-        <p:nvPicPr>
-          <p:cNvPr id="1028" name="Picture 4" descr="http://www.cise.ufl.edu/research/ParallelPatterns/PatternLanguage/AlgorithmStructure/Figures/pipeline-stages.gif"/>
-          <p:cNvPicPr>
-            <a:picLocks noChangeAspect="1" noChangeArrowheads="1"/>
-          </p:cNvPicPr>
-          <p:nvPr/>
-        </p:nvPicPr>
-        <p:blipFill>
-          <a:blip r:embed="rId2">
-            <a:extLst>
-              <a:ext uri="{28A0092B-C50C-407E-A947-70E740481C1C}">
-                <a14:useLocalDpi xmlns:a14="http://schemas.microsoft.com/office/drawing/2010/main" val="0"/>
-              </a:ext>
-            </a:extLst>
-          </a:blip>
-          <a:srcRect/>
-          <a:stretch>
-            <a:fillRect/>
-          </a:stretch>
-        </p:blipFill>
-        <p:spPr bwMode="auto">
-          <a:xfrm>
-            <a:off x="2185987" y="2362200"/>
-            <a:ext cx="4772025" cy="2371726"/>
-          </a:xfrm>
-          <a:prstGeom prst="rect">
-            <a:avLst/>
-          </a:prstGeom>
-          <a:noFill/>
-          <a:extLst>
-            <a:ext uri="{909E8E84-426E-40DD-AFC4-6F175D3DCCD1}">
-              <a14:hiddenFill xmlns:a14="http://schemas.microsoft.com/office/drawing/2010/main">
-                <a:solidFill>
-                  <a:srgbClr val="FFFFFF"/>
-                </a:solidFill>
-              </a14:hiddenFill>
-            </a:ext>
-          </a:extLst>
-        </p:spPr>
-      </p:pic>
-    </p:spTree>
-    <p:extLst>
-      <p:ext uri="{BB962C8B-B14F-4D97-AF65-F5344CB8AC3E}">
-        <p14:creationId xmlns:p14="http://schemas.microsoft.com/office/powerpoint/2010/main" val="663681793"/>
-      </p:ext>
-    </p:extLst>
-  </p:cSld>
-  <p:clrMapOvr>
-    <a:masterClrMapping/>
-  </p:clrMapOvr>
-  <p:transition>
-    <p:fade/>
-  </p:transition>
-</p:sld>
-</file>
-
-<file path=ppt/slides/slide4.xml><?xml version="1.0" encoding="utf-8"?>
-<p:sld xmlns:a="http://schemas.openxmlformats.org/drawingml/2006/main" xmlns:r="http://schemas.openxmlformats.org/officeDocument/2006/relationships" xmlns:p="http://schemas.openxmlformats.org/presentationml/2006/main">
-  <p:cSld>
-    <p:spTree>
-      <p:nvGrpSpPr>
-        <p:cNvPr id="1" name=""/>
-        <p:cNvGrpSpPr/>
-        <p:nvPr/>
-      </p:nvGrpSpPr>
-      <p:grpSpPr>
-        <a:xfrm>
-          <a:off x="0" y="0"/>
-          <a:ext cx="0" cy="0"/>
-          <a:chOff x="0" y="0"/>
-          <a:chExt cx="0" cy="0"/>
-        </a:xfrm>
-      </p:grpSpPr>
-      <p:sp>
-        <p:nvSpPr>
-          <p:cNvPr id="2" name="Title 1"/>
-          <p:cNvSpPr>
-            <a:spLocks noGrp="1"/>
-          </p:cNvSpPr>
-          <p:nvPr>
-            <p:ph type="title"/>
-          </p:nvPr>
-        </p:nvSpPr>
-        <p:spPr/>
-        <p:txBody>
-          <a:bodyPr/>
-          <a:lstStyle/>
-          <a:p>
-            <a:r>
-              <a:rPr lang="en-US" dirty="0"/>
               <a:t>Middleware</a:t>
             </a:r>
           </a:p>
@@ -4783,7 +4238,7 @@
 </p:sld>
 </file>
 
-<file path=ppt/slides/slide5.xml><?xml version="1.0" encoding="utf-8"?>
+<file path=ppt/slides/slide3.xml><?xml version="1.0" encoding="utf-8"?>
 <p:sld xmlns:a="http://schemas.openxmlformats.org/drawingml/2006/main" xmlns:r="http://schemas.openxmlformats.org/officeDocument/2006/relationships" xmlns:p="http://schemas.openxmlformats.org/presentationml/2006/main">
   <p:cSld>
     <p:spTree>
@@ -4898,7 +4353,7 @@
 </p:sld>
 </file>
 
-<file path=ppt/slides/slide6.xml><?xml version="1.0" encoding="utf-8"?>
+<file path=ppt/slides/slide4.xml><?xml version="1.0" encoding="utf-8"?>
 <p:sld xmlns:a="http://schemas.openxmlformats.org/drawingml/2006/main" xmlns:r="http://schemas.openxmlformats.org/officeDocument/2006/relationships" xmlns:p="http://schemas.openxmlformats.org/presentationml/2006/main">
   <p:cSld>
     <p:spTree>
@@ -5027,7 +4482,7 @@
 </p:sld>
 </file>
 
-<file path=ppt/slides/slide7.xml><?xml version="1.0" encoding="utf-8"?>
+<file path=ppt/slides/slide5.xml><?xml version="1.0" encoding="utf-8"?>
 <p:sld xmlns:a="http://schemas.openxmlformats.org/drawingml/2006/main" xmlns:r="http://schemas.openxmlformats.org/officeDocument/2006/relationships" xmlns:p="http://schemas.openxmlformats.org/presentationml/2006/main">
   <p:cSld>
     <p:spTree>
@@ -5129,7 +4584,7 @@
 </p:sld>
 </file>
 
-<file path=ppt/slides/slide8.xml><?xml version="1.0" encoding="utf-8"?>
+<file path=ppt/slides/slide6.xml><?xml version="1.0" encoding="utf-8"?>
 <p:sld xmlns:a="http://schemas.openxmlformats.org/drawingml/2006/main" xmlns:r="http://schemas.openxmlformats.org/officeDocument/2006/relationships" xmlns:p="http://schemas.openxmlformats.org/presentationml/2006/main">
   <p:cSld>
     <p:spTree>
@@ -5242,7 +4697,7 @@
 </p:sld>
 </file>
 
-<file path=ppt/slides/slide9.xml><?xml version="1.0" encoding="utf-8"?>
+<file path=ppt/slides/slide7.xml><?xml version="1.0" encoding="utf-8"?>
 <p:sld xmlns:a="http://schemas.openxmlformats.org/drawingml/2006/main" xmlns:r="http://schemas.openxmlformats.org/officeDocument/2006/relationships" xmlns:p="http://schemas.openxmlformats.org/presentationml/2006/main">
   <p:cSld>
     <p:spTree>
@@ -5348,6 +4803,239 @@
     <p:extLst>
       <p:ext uri="{BB962C8B-B14F-4D97-AF65-F5344CB8AC3E}">
         <p14:creationId xmlns:p14="http://schemas.microsoft.com/office/powerpoint/2010/main" val="1738809062"/>
+      </p:ext>
+    </p:extLst>
+  </p:cSld>
+  <p:clrMapOvr>
+    <a:masterClrMapping/>
+  </p:clrMapOvr>
+  <p:transition>
+    <p:fade/>
+  </p:transition>
+</p:sld>
+</file>
+
+<file path=ppt/slides/slide8.xml><?xml version="1.0" encoding="utf-8"?>
+<p:sld xmlns:a="http://schemas.openxmlformats.org/drawingml/2006/main" xmlns:r="http://schemas.openxmlformats.org/officeDocument/2006/relationships" xmlns:p="http://schemas.openxmlformats.org/presentationml/2006/main">
+  <p:cSld>
+    <p:spTree>
+      <p:nvGrpSpPr>
+        <p:cNvPr id="1" name=""/>
+        <p:cNvGrpSpPr/>
+        <p:nvPr/>
+      </p:nvGrpSpPr>
+      <p:grpSpPr>
+        <a:xfrm>
+          <a:off x="0" y="0"/>
+          <a:ext cx="0" cy="0"/>
+          <a:chOff x="0" y="0"/>
+          <a:chExt cx="0" cy="0"/>
+        </a:xfrm>
+      </p:grpSpPr>
+      <p:sp>
+        <p:nvSpPr>
+          <p:cNvPr id="2" name="Title 1"/>
+          <p:cNvSpPr>
+            <a:spLocks noGrp="1"/>
+          </p:cNvSpPr>
+          <p:nvPr>
+            <p:ph type="title"/>
+          </p:nvPr>
+        </p:nvSpPr>
+        <p:spPr/>
+        <p:txBody>
+          <a:bodyPr/>
+          <a:lstStyle/>
+          <a:p>
+            <a:r>
+              <a:rPr lang="en-US" dirty="0" err="1"/>
+              <a:t>app.UseMiddleware</a:t>
+            </a:r>
+            <a:endParaRPr lang="en-US" dirty="0"/>
+          </a:p>
+        </p:txBody>
+      </p:sp>
+      <p:sp>
+        <p:nvSpPr>
+          <p:cNvPr id="3" name="Text Placeholder 2"/>
+          <p:cNvSpPr>
+            <a:spLocks noGrp="1"/>
+          </p:cNvSpPr>
+          <p:nvPr>
+            <p:ph type="body" idx="1"/>
+          </p:nvPr>
+        </p:nvSpPr>
+        <p:spPr/>
+        <p:txBody>
+          <a:bodyPr/>
+          <a:lstStyle/>
+          <a:p>
+            <a:r>
+              <a:rPr lang="en-US" dirty="0"/>
+              <a:t>Encapsulate middleware in a class</a:t>
+            </a:r>
+          </a:p>
+          <a:p>
+            <a:r>
+              <a:rPr lang="en-US" dirty="0"/>
+              <a:t>Requires constructor and Invoke method</a:t>
+            </a:r>
+          </a:p>
+        </p:txBody>
+      </p:sp>
+      <p:pic>
+        <p:nvPicPr>
+          <p:cNvPr id="4" name="Picture 3"/>
+          <p:cNvPicPr>
+            <a:picLocks noChangeAspect="1"/>
+          </p:cNvPicPr>
+          <p:nvPr/>
+        </p:nvPicPr>
+        <p:blipFill>
+          <a:blip r:embed="rId2"/>
+          <a:stretch>
+            <a:fillRect/>
+          </a:stretch>
+        </p:blipFill>
+        <p:spPr>
+          <a:xfrm>
+            <a:off x="685800" y="2671762"/>
+            <a:ext cx="5457825" cy="2047875"/>
+          </a:xfrm>
+          <a:prstGeom prst="rect">
+            <a:avLst/>
+          </a:prstGeom>
+        </p:spPr>
+      </p:pic>
+      <p:pic>
+        <p:nvPicPr>
+          <p:cNvPr id="5" name="Picture 4"/>
+          <p:cNvPicPr>
+            <a:picLocks noChangeAspect="1"/>
+          </p:cNvPicPr>
+          <p:nvPr/>
+        </p:nvPicPr>
+        <p:blipFill>
+          <a:blip r:embed="rId3"/>
+          <a:stretch>
+            <a:fillRect/>
+          </a:stretch>
+        </p:blipFill>
+        <p:spPr>
+          <a:xfrm>
+            <a:off x="3276600" y="5002319"/>
+            <a:ext cx="5219700" cy="638175"/>
+          </a:xfrm>
+          <a:prstGeom prst="rect">
+            <a:avLst/>
+          </a:prstGeom>
+        </p:spPr>
+      </p:pic>
+    </p:spTree>
+    <p:extLst>
+      <p:ext uri="{BB962C8B-B14F-4D97-AF65-F5344CB8AC3E}">
+        <p14:creationId xmlns:p14="http://schemas.microsoft.com/office/powerpoint/2010/main" val="1171627209"/>
+      </p:ext>
+    </p:extLst>
+  </p:cSld>
+  <p:clrMapOvr>
+    <a:masterClrMapping/>
+  </p:clrMapOvr>
+  <p:transition>
+    <p:fade/>
+  </p:transition>
+</p:sld>
+</file>
+
+<file path=ppt/slides/slide9.xml><?xml version="1.0" encoding="utf-8"?>
+<p:sld xmlns:a="http://schemas.openxmlformats.org/drawingml/2006/main" xmlns:r="http://schemas.openxmlformats.org/officeDocument/2006/relationships" xmlns:p="http://schemas.openxmlformats.org/presentationml/2006/main">
+  <p:cSld>
+    <p:spTree>
+      <p:nvGrpSpPr>
+        <p:cNvPr id="1" name=""/>
+        <p:cNvGrpSpPr/>
+        <p:nvPr/>
+      </p:nvGrpSpPr>
+      <p:grpSpPr>
+        <a:xfrm>
+          <a:off x="0" y="0"/>
+          <a:ext cx="0" cy="0"/>
+          <a:chOff x="0" y="0"/>
+          <a:chExt cx="0" cy="0"/>
+        </a:xfrm>
+      </p:grpSpPr>
+      <p:sp>
+        <p:nvSpPr>
+          <p:cNvPr id="2" name="Title 1"/>
+          <p:cNvSpPr>
+            <a:spLocks noGrp="1"/>
+          </p:cNvSpPr>
+          <p:nvPr>
+            <p:ph type="title"/>
+          </p:nvPr>
+        </p:nvSpPr>
+        <p:spPr/>
+        <p:txBody>
+          <a:bodyPr/>
+          <a:lstStyle/>
+          <a:p>
+            <a:r>
+              <a:rPr lang="en-US" dirty="0"/>
+              <a:t>Custom Middleware</a:t>
+            </a:r>
+          </a:p>
+        </p:txBody>
+      </p:sp>
+      <p:sp>
+        <p:nvSpPr>
+          <p:cNvPr id="3" name="Text Placeholder 2"/>
+          <p:cNvSpPr>
+            <a:spLocks noGrp="1"/>
+          </p:cNvSpPr>
+          <p:nvPr>
+            <p:ph type="body" idx="1"/>
+          </p:nvPr>
+        </p:nvSpPr>
+        <p:spPr/>
+        <p:txBody>
+          <a:bodyPr/>
+          <a:lstStyle/>
+          <a:p>
+            <a:r>
+              <a:rPr lang="en-US" dirty="0"/>
+              <a:t>Convention is to create custom options and Use methods. </a:t>
+            </a:r>
+          </a:p>
+        </p:txBody>
+      </p:sp>
+      <p:pic>
+        <p:nvPicPr>
+          <p:cNvPr id="4" name="Picture 3"/>
+          <p:cNvPicPr>
+            <a:picLocks noChangeAspect="1"/>
+          </p:cNvPicPr>
+          <p:nvPr/>
+        </p:nvPicPr>
+        <p:blipFill>
+          <a:blip r:embed="rId2"/>
+          <a:stretch>
+            <a:fillRect/>
+          </a:stretch>
+        </p:blipFill>
+        <p:spPr>
+          <a:xfrm>
+            <a:off x="1885950" y="2943225"/>
+            <a:ext cx="5372100" cy="971550"/>
+          </a:xfrm>
+          <a:prstGeom prst="rect">
+            <a:avLst/>
+          </a:prstGeom>
+        </p:spPr>
+      </p:pic>
+    </p:spTree>
+    <p:extLst>
+      <p:ext uri="{BB962C8B-B14F-4D97-AF65-F5344CB8AC3E}">
+        <p14:creationId xmlns:p14="http://schemas.microsoft.com/office/powerpoint/2010/main" val="3694306967"/>
       </p:ext>
     </p:extLst>
   </p:cSld>

</xml_diff>